<commit_message>
update the gRPC-ClusterController_ResourceCollector note
Signed-off-by: cathy hong zhang <hzhang@futurewei.com>
</commit_message>
<xml_diff>
--- a/docs/misc/gRPC-ClusterController-ResourceCollector.pptx
+++ b/docs/misc/gRPC-ClusterController-ResourceCollector.pptx
@@ -199,7 +199,7 @@
           <a:p>
             <a:fld id="{D0601EAA-F4BD-4B32-A92C-DBBD8FEC7ED9}" type="datetimeFigureOut">
               <a:rPr lang="en-US" smtClean="0"/>
-              <a:t>12/22/2020</a:t>
+              <a:t>12/23/2020</a:t>
             </a:fld>
             <a:endParaRPr lang="en-US"/>
           </a:p>
@@ -781,7 +781,7 @@
           <a:p>
             <a:fld id="{169006C1-32A2-48EA-872C-CECFF70D1C1F}" type="datetimeFigureOut">
               <a:rPr lang="en-US" smtClean="0"/>
-              <a:t>12/22/2020</a:t>
+              <a:t>12/23/2020</a:t>
             </a:fld>
             <a:endParaRPr lang="en-US"/>
           </a:p>
@@ -979,7 +979,7 @@
           <a:p>
             <a:fld id="{169006C1-32A2-48EA-872C-CECFF70D1C1F}" type="datetimeFigureOut">
               <a:rPr lang="en-US" smtClean="0"/>
-              <a:t>12/22/2020</a:t>
+              <a:t>12/23/2020</a:t>
             </a:fld>
             <a:endParaRPr lang="en-US"/>
           </a:p>
@@ -1187,7 +1187,7 @@
           <a:p>
             <a:fld id="{169006C1-32A2-48EA-872C-CECFF70D1C1F}" type="datetimeFigureOut">
               <a:rPr lang="en-US" smtClean="0"/>
-              <a:t>12/22/2020</a:t>
+              <a:t>12/23/2020</a:t>
             </a:fld>
             <a:endParaRPr lang="en-US"/>
           </a:p>
@@ -1385,7 +1385,7 @@
           <a:p>
             <a:fld id="{169006C1-32A2-48EA-872C-CECFF70D1C1F}" type="datetimeFigureOut">
               <a:rPr lang="en-US" smtClean="0"/>
-              <a:t>12/22/2020</a:t>
+              <a:t>12/23/2020</a:t>
             </a:fld>
             <a:endParaRPr lang="en-US"/>
           </a:p>
@@ -1660,7 +1660,7 @@
           <a:p>
             <a:fld id="{169006C1-32A2-48EA-872C-CECFF70D1C1F}" type="datetimeFigureOut">
               <a:rPr lang="en-US" smtClean="0"/>
-              <a:t>12/22/2020</a:t>
+              <a:t>12/23/2020</a:t>
             </a:fld>
             <a:endParaRPr lang="en-US"/>
           </a:p>
@@ -1925,7 +1925,7 @@
           <a:p>
             <a:fld id="{169006C1-32A2-48EA-872C-CECFF70D1C1F}" type="datetimeFigureOut">
               <a:rPr lang="en-US" smtClean="0"/>
-              <a:t>12/22/2020</a:t>
+              <a:t>12/23/2020</a:t>
             </a:fld>
             <a:endParaRPr lang="en-US"/>
           </a:p>
@@ -2337,7 +2337,7 @@
           <a:p>
             <a:fld id="{169006C1-32A2-48EA-872C-CECFF70D1C1F}" type="datetimeFigureOut">
               <a:rPr lang="en-US" smtClean="0"/>
-              <a:t>12/22/2020</a:t>
+              <a:t>12/23/2020</a:t>
             </a:fld>
             <a:endParaRPr lang="en-US"/>
           </a:p>
@@ -2478,7 +2478,7 @@
           <a:p>
             <a:fld id="{169006C1-32A2-48EA-872C-CECFF70D1C1F}" type="datetimeFigureOut">
               <a:rPr lang="en-US" smtClean="0"/>
-              <a:t>12/22/2020</a:t>
+              <a:t>12/23/2020</a:t>
             </a:fld>
             <a:endParaRPr lang="en-US"/>
           </a:p>
@@ -2591,7 +2591,7 @@
           <a:p>
             <a:fld id="{169006C1-32A2-48EA-872C-CECFF70D1C1F}" type="datetimeFigureOut">
               <a:rPr lang="en-US" smtClean="0"/>
-              <a:t>12/22/2020</a:t>
+              <a:t>12/23/2020</a:t>
             </a:fld>
             <a:endParaRPr lang="en-US"/>
           </a:p>
@@ -2902,7 +2902,7 @@
           <a:p>
             <a:fld id="{169006C1-32A2-48EA-872C-CECFF70D1C1F}" type="datetimeFigureOut">
               <a:rPr lang="en-US" smtClean="0"/>
-              <a:t>12/22/2020</a:t>
+              <a:t>12/23/2020</a:t>
             </a:fld>
             <a:endParaRPr lang="en-US"/>
           </a:p>
@@ -3190,7 +3190,7 @@
           <a:p>
             <a:fld id="{169006C1-32A2-48EA-872C-CECFF70D1C1F}" type="datetimeFigureOut">
               <a:rPr lang="en-US" smtClean="0"/>
-              <a:t>12/22/2020</a:t>
+              <a:t>12/23/2020</a:t>
             </a:fld>
             <a:endParaRPr lang="en-US"/>
           </a:p>
@@ -3431,7 +3431,7 @@
           <a:p>
             <a:fld id="{169006C1-32A2-48EA-872C-CECFF70D1C1F}" type="datetimeFigureOut">
               <a:rPr lang="en-US" smtClean="0"/>
-              <a:t>12/22/2020</a:t>
+              <a:t>12/23/2020</a:t>
             </a:fld>
             <a:endParaRPr lang="en-US"/>
           </a:p>
@@ -5294,7 +5294,7 @@
             </a:pPr>
             <a:r>
               <a:rPr lang="en-US" dirty="0"/>
-              <a:t>unzip protoc-3.13.0-linux-x86_64.zip -d $HOME/.local</a:t>
+              <a:t>unzip protoc-3.12.1-linux-x86_64.zip -d $HOME/.local</a:t>
             </a:r>
           </a:p>
           <a:p>

</xml_diff>